<commit_message>
add feed back bullets
</commit_message>
<xml_diff>
--- a/Documentation/Presentations/Hotspotter Beta.pptx
+++ b/Documentation/Presentations/Hotspotter Beta.pptx
@@ -955,12 +955,12 @@
   <p:extLst mod="1">
     <p:ext uri="{DCECCB84-F9BA-43D5-87BE-67443E8EF086}">
       <p15:sldGuideLst xmlns:p15="http://schemas.microsoft.com/office/powerpoint/2012/main">
-        <p15:guide id="4294967295" orient="horz" pos="2160">
+        <p15:guide id="1" orient="horz" pos="2160">
           <p15:clr>
             <a:srgbClr val="FBAE40"/>
           </p15:clr>
         </p15:guide>
-        <p15:guide id="4294967295" pos="3839">
+        <p15:guide id="2" pos="3839">
           <p15:clr>
             <a:srgbClr val="FBAE40"/>
           </p15:clr>
@@ -5587,6 +5587,88 @@
               <a:t>02/29/2016</a:t>
             </a:fld>
             <a:endParaRPr lang="en-US"/>
+          </a:p>
+        </p:txBody>
+      </p:sp>
+      <p:sp>
+        <p:nvSpPr>
+          <p:cNvPr id="3" name="TextBox 2"/>
+          <p:cNvSpPr txBox="1"/>
+          <p:nvPr/>
+        </p:nvSpPr>
+        <p:spPr>
+          <a:xfrm>
+            <a:off x="980303" y="2726725"/>
+            <a:ext cx="8682681" cy="1754326"/>
+          </a:xfrm>
+          <a:prstGeom prst="rect">
+            <a:avLst/>
+          </a:prstGeom>
+          <a:noFill/>
+        </p:spPr>
+        <p:txBody>
+          <a:bodyPr wrap="square" rtlCol="0">
+            <a:spAutoFit/>
+          </a:bodyPr>
+          <a:lstStyle/>
+          <a:p>
+            <a:pPr marL="285750" indent="-285750">
+              <a:buFont typeface="Arial" panose="020B0604020202020204" pitchFamily="34" charset="0"/>
+              <a:buChar char="•"/>
+            </a:pPr>
+            <a:r>
+              <a:rPr lang="en-US" dirty="0" smtClean="0"/>
+              <a:t>Consult with Dr. </a:t>
+            </a:r>
+            <a:r>
+              <a:rPr lang="en-US" dirty="0" err="1" smtClean="0"/>
+              <a:t>Crk</a:t>
+            </a:r>
+            <a:r>
+              <a:rPr lang="en-US" dirty="0" smtClean="0"/>
+              <a:t> after a week of testing in his hands.</a:t>
+            </a:r>
+          </a:p>
+          <a:p>
+            <a:pPr marL="285750" indent="-285750">
+              <a:buFont typeface="Arial" panose="020B0604020202020204" pitchFamily="34" charset="0"/>
+              <a:buChar char="•"/>
+            </a:pPr>
+            <a:endParaRPr lang="en-US" dirty="0" smtClean="0"/>
+          </a:p>
+          <a:p>
+            <a:pPr marL="285750" indent="-285750">
+              <a:buFont typeface="Arial" panose="020B0604020202020204" pitchFamily="34" charset="0"/>
+              <a:buChar char="•"/>
+            </a:pPr>
+            <a:r>
+              <a:rPr lang="en-US" dirty="0" smtClean="0"/>
+              <a:t>Document any concerns.</a:t>
+            </a:r>
+          </a:p>
+          <a:p>
+            <a:pPr marL="285750" indent="-285750">
+              <a:buFont typeface="Arial" panose="020B0604020202020204" pitchFamily="34" charset="0"/>
+              <a:buChar char="•"/>
+            </a:pPr>
+            <a:endParaRPr lang="en-US" dirty="0" smtClean="0"/>
+          </a:p>
+          <a:p>
+            <a:pPr marL="285750" indent="-285750">
+              <a:buFont typeface="Arial" panose="020B0604020202020204" pitchFamily="34" charset="0"/>
+              <a:buChar char="•"/>
+            </a:pPr>
+            <a:r>
+              <a:rPr lang="en-US" dirty="0" smtClean="0"/>
+              <a:t>Address concerns during next sprint.</a:t>
+            </a:r>
+          </a:p>
+          <a:p>
+            <a:pPr marL="285750" indent="-285750">
+              <a:buFont typeface="Arial" panose="020B0604020202020204" pitchFamily="34" charset="0"/>
+              <a:buChar char="•"/>
+            </a:pPr>
+            <a:endParaRPr lang="en-US" dirty="0"/>
           </a:p>
         </p:txBody>
       </p:sp>

</xml_diff>